<commit_message>
done note book and presentation slide
</commit_message>
<xml_diff>
--- a/Bussiness_problem_and_datasets.pptx
+++ b/Bussiness_problem_and_datasets.pptx
@@ -12,6 +12,14 @@
     <p:sldId id="260" r:id="rId6"/>
     <p:sldId id="272" r:id="rId7"/>
     <p:sldId id="273" r:id="rId8"/>
+    <p:sldId id="275" r:id="rId9"/>
+    <p:sldId id="276" r:id="rId10"/>
+    <p:sldId id="277" r:id="rId11"/>
+    <p:sldId id="278" r:id="rId12"/>
+    <p:sldId id="279" r:id="rId13"/>
+    <p:sldId id="280" r:id="rId14"/>
+    <p:sldId id="281" r:id="rId15"/>
+    <p:sldId id="282" r:id="rId16"/>
   </p:sldIdLst>
   <p:sldSz cx="12192000" cy="6858000"/>
   <p:notesSz cx="6858000" cy="9144000"/>
@@ -306,7 +314,7 @@
           <a:p>
             <a:fld id="{48A87A34-81AB-432B-8DAE-1953F412C126}" type="datetimeFigureOut">
               <a:rPr lang="en-US" smtClean="0"/>
-              <a:t>3/14/2019</a:t>
+              <a:t>3/15/2019</a:t>
             </a:fld>
             <a:endParaRPr lang="en-US" dirty="0"/>
           </a:p>
@@ -645,7 +653,7 @@
             <a:fld id="{48A87A34-81AB-432B-8DAE-1953F412C126}" type="datetimeFigureOut">
               <a:rPr lang="en-US" smtClean="0"/>
               <a:pPr/>
-              <a:t>3/14/2019</a:t>
+              <a:t>3/15/2019</a:t>
             </a:fld>
             <a:endParaRPr lang="en-US" dirty="0"/>
           </a:p>
@@ -1048,7 +1056,7 @@
             <a:fld id="{48A87A34-81AB-432B-8DAE-1953F412C126}" type="datetimeFigureOut">
               <a:rPr lang="en-US" smtClean="0"/>
               <a:pPr/>
-              <a:t>3/14/2019</a:t>
+              <a:t>3/15/2019</a:t>
             </a:fld>
             <a:endParaRPr lang="en-US" dirty="0"/>
           </a:p>
@@ -1386,7 +1394,7 @@
             <a:fld id="{48A87A34-81AB-432B-8DAE-1953F412C126}" type="datetimeFigureOut">
               <a:rPr lang="en-US" smtClean="0"/>
               <a:pPr/>
-              <a:t>3/14/2019</a:t>
+              <a:t>3/15/2019</a:t>
             </a:fld>
             <a:endParaRPr lang="en-US" dirty="0"/>
           </a:p>
@@ -1708,7 +1716,7 @@
             <a:fld id="{48A87A34-81AB-432B-8DAE-1953F412C126}" type="datetimeFigureOut">
               <a:rPr lang="en-US" smtClean="0"/>
               <a:pPr/>
-              <a:t>3/14/2019</a:t>
+              <a:t>3/15/2019</a:t>
             </a:fld>
             <a:endParaRPr lang="en-US" dirty="0"/>
           </a:p>
@@ -2106,7 +2114,7 @@
             <a:fld id="{48A87A34-81AB-432B-8DAE-1953F412C126}" type="datetimeFigureOut">
               <a:rPr lang="en-US" smtClean="0"/>
               <a:pPr/>
-              <a:t>3/14/2019</a:t>
+              <a:t>3/15/2019</a:t>
             </a:fld>
             <a:endParaRPr lang="en-US" dirty="0"/>
           </a:p>
@@ -2364,7 +2372,7 @@
           <a:p>
             <a:fld id="{48A87A34-81AB-432B-8DAE-1953F412C126}" type="datetimeFigureOut">
               <a:rPr lang="en-US" smtClean="0"/>
-              <a:t>3/14/2019</a:t>
+              <a:t>3/15/2019</a:t>
             </a:fld>
             <a:endParaRPr lang="en-US" dirty="0"/>
           </a:p>
@@ -2626,7 +2634,7 @@
           <a:p>
             <a:fld id="{48A87A34-81AB-432B-8DAE-1953F412C126}" type="datetimeFigureOut">
               <a:rPr lang="en-US" smtClean="0"/>
-              <a:t>3/14/2019</a:t>
+              <a:t>3/15/2019</a:t>
             </a:fld>
             <a:endParaRPr lang="en-US" dirty="0"/>
           </a:p>
@@ -2888,7 +2896,7 @@
           <a:p>
             <a:fld id="{48A87A34-81AB-432B-8DAE-1953F412C126}" type="datetimeFigureOut">
               <a:rPr lang="en-US" smtClean="0"/>
-              <a:t>3/14/2019</a:t>
+              <a:t>3/15/2019</a:t>
             </a:fld>
             <a:endParaRPr lang="en-US" dirty="0"/>
           </a:p>
@@ -3217,7 +3225,7 @@
           <a:p>
             <a:fld id="{48A87A34-81AB-432B-8DAE-1953F412C126}" type="datetimeFigureOut">
               <a:rPr lang="en-US" smtClean="0"/>
-              <a:t>3/14/2019</a:t>
+              <a:t>3/15/2019</a:t>
             </a:fld>
             <a:endParaRPr lang="en-US" dirty="0"/>
           </a:p>
@@ -3540,7 +3548,7 @@
           <a:p>
             <a:fld id="{48A87A34-81AB-432B-8DAE-1953F412C126}" type="datetimeFigureOut">
               <a:rPr lang="en-US" smtClean="0"/>
-              <a:t>3/14/2019</a:t>
+              <a:t>3/15/2019</a:t>
             </a:fld>
             <a:endParaRPr lang="en-US" dirty="0"/>
           </a:p>
@@ -3997,7 +4005,7 @@
           <a:p>
             <a:fld id="{48A87A34-81AB-432B-8DAE-1953F412C126}" type="datetimeFigureOut">
               <a:rPr lang="en-US" smtClean="0"/>
-              <a:t>3/14/2019</a:t>
+              <a:t>3/15/2019</a:t>
             </a:fld>
             <a:endParaRPr lang="en-US" dirty="0"/>
           </a:p>
@@ -4202,7 +4210,7 @@
           <a:p>
             <a:fld id="{48A87A34-81AB-432B-8DAE-1953F412C126}" type="datetimeFigureOut">
               <a:rPr lang="en-US" smtClean="0"/>
-              <a:t>3/14/2019</a:t>
+              <a:t>3/15/2019</a:t>
             </a:fld>
             <a:endParaRPr lang="en-US" dirty="0"/>
           </a:p>
@@ -4379,7 +4387,7 @@
           <a:p>
             <a:fld id="{48A87A34-81AB-432B-8DAE-1953F412C126}" type="datetimeFigureOut">
               <a:rPr lang="en-US" smtClean="0"/>
-              <a:t>3/14/2019</a:t>
+              <a:t>3/15/2019</a:t>
             </a:fld>
             <a:endParaRPr lang="en-US" dirty="0"/>
           </a:p>
@@ -4712,7 +4720,7 @@
           <a:p>
             <a:fld id="{48A87A34-81AB-432B-8DAE-1953F412C126}" type="datetimeFigureOut">
               <a:rPr lang="en-US" smtClean="0"/>
-              <a:t>3/14/2019</a:t>
+              <a:t>3/15/2019</a:t>
             </a:fld>
             <a:endParaRPr lang="en-US" dirty="0"/>
           </a:p>
@@ -5058,7 +5066,7 @@
             <a:fld id="{48A87A34-81AB-432B-8DAE-1953F412C126}" type="datetimeFigureOut">
               <a:rPr lang="en-US" smtClean="0"/>
               <a:pPr/>
-              <a:t>3/14/2019</a:t>
+              <a:t>3/15/2019</a:t>
             </a:fld>
             <a:endParaRPr lang="en-US" dirty="0"/>
           </a:p>
@@ -7176,7 +7184,7 @@
             <a:fld id="{48A87A34-81AB-432B-8DAE-1953F412C126}" type="datetimeFigureOut">
               <a:rPr lang="en-US" smtClean="0"/>
               <a:pPr/>
-              <a:t>3/14/2019</a:t>
+              <a:t>3/15/2019</a:t>
             </a:fld>
             <a:endParaRPr lang="en-US" dirty="0"/>
           </a:p>
@@ -7812,6 +7820,1160 @@
 </p:sld>
 </file>
 
+<file path=ppt/slides/slide10.xml><?xml version="1.0" encoding="utf-8"?>
+<p:sld xmlns:a="http://schemas.openxmlformats.org/drawingml/2006/main" xmlns:r="http://schemas.openxmlformats.org/officeDocument/2006/relationships" xmlns:p="http://schemas.openxmlformats.org/presentationml/2006/main">
+  <p:cSld>
+    <p:spTree>
+      <p:nvGrpSpPr>
+        <p:cNvPr id="1" name=""/>
+        <p:cNvGrpSpPr/>
+        <p:nvPr/>
+      </p:nvGrpSpPr>
+      <p:grpSpPr>
+        <a:xfrm>
+          <a:off x="0" y="0"/>
+          <a:ext cx="0" cy="0"/>
+          <a:chOff x="0" y="0"/>
+          <a:chExt cx="0" cy="0"/>
+        </a:xfrm>
+      </p:grpSpPr>
+      <p:sp>
+        <p:nvSpPr>
+          <p:cNvPr id="2" name="Title 1">
+            <a:extLst>
+              <a:ext uri="{FF2B5EF4-FFF2-40B4-BE49-F238E27FC236}">
+                <a16:creationId xmlns:a16="http://schemas.microsoft.com/office/drawing/2014/main" id="{ECED6C5E-F160-BB45-A245-FCB61D79379A}"/>
+              </a:ext>
+            </a:extLst>
+          </p:cNvPr>
+          <p:cNvSpPr>
+            <a:spLocks noGrp="1"/>
+          </p:cNvSpPr>
+          <p:nvPr>
+            <p:ph type="title"/>
+          </p:nvPr>
+        </p:nvSpPr>
+        <p:spPr>
+          <a:xfrm>
+            <a:off x="2592925" y="624110"/>
+            <a:ext cx="8911687" cy="1140296"/>
+          </a:xfrm>
+        </p:spPr>
+        <p:txBody>
+          <a:bodyPr>
+            <a:normAutofit fontScale="90000"/>
+          </a:bodyPr>
+          <a:lstStyle/>
+          <a:p>
+            <a:r>
+              <a:rPr lang="en-US" sz="4000" dirty="0"/>
+              <a:t>4. Analysis</a:t>
+            </a:r>
+            <a:r>
+              <a:rPr lang="en-US" sz="3200" dirty="0"/>
+              <a:t/>
+            </a:r>
+            <a:br>
+              <a:rPr lang="en-US" sz="3200" dirty="0"/>
+            </a:br>
+            <a:r>
+              <a:rPr lang="en-US" dirty="0">
+                <a:solidFill>
+                  <a:schemeClr val="accent2">
+                    <a:lumMod val="75000"/>
+                  </a:schemeClr>
+                </a:solidFill>
+              </a:rPr>
+              <a:t>4.1 Analyze Each </a:t>
+            </a:r>
+            <a:r>
+              <a:rPr lang="en-US" dirty="0" smtClean="0">
+                <a:solidFill>
+                  <a:schemeClr val="accent2">
+                    <a:lumMod val="75000"/>
+                  </a:schemeClr>
+                </a:solidFill>
+              </a:rPr>
+              <a:t>Project</a:t>
+            </a:r>
+            <a:br>
+              <a:rPr lang="en-US" dirty="0" smtClean="0">
+                <a:solidFill>
+                  <a:schemeClr val="accent2">
+                    <a:lumMod val="75000"/>
+                  </a:schemeClr>
+                </a:solidFill>
+              </a:rPr>
+            </a:br>
+            <a:r>
+              <a:rPr lang="en-US" sz="2800" cap="all" dirty="0"/>
+              <a:t>Most common venues around each project </a:t>
+            </a:r>
+            <a:endParaRPr lang="en-US" sz="2800" cap="all" dirty="0"/>
+          </a:p>
+        </p:txBody>
+      </p:sp>
+      <p:pic>
+        <p:nvPicPr>
+          <p:cNvPr id="3" name="Picture 2"/>
+          <p:cNvPicPr>
+            <a:picLocks noChangeAspect="1"/>
+          </p:cNvPicPr>
+          <p:nvPr/>
+        </p:nvPicPr>
+        <p:blipFill>
+          <a:blip r:embed="rId2"/>
+          <a:stretch>
+            <a:fillRect/>
+          </a:stretch>
+        </p:blipFill>
+        <p:spPr>
+          <a:xfrm>
+            <a:off x="517368" y="2301024"/>
+            <a:ext cx="11390876" cy="3095223"/>
+          </a:xfrm>
+          <a:prstGeom prst="rect">
+            <a:avLst/>
+          </a:prstGeom>
+        </p:spPr>
+      </p:pic>
+      <p:sp>
+        <p:nvSpPr>
+          <p:cNvPr id="4" name="Rounded Rectangle 3"/>
+          <p:cNvSpPr/>
+          <p:nvPr/>
+        </p:nvSpPr>
+        <p:spPr>
+          <a:xfrm>
+            <a:off x="2034862" y="2301024"/>
+            <a:ext cx="9873382" cy="3095223"/>
+          </a:xfrm>
+          <a:prstGeom prst="roundRect">
+            <a:avLst/>
+          </a:prstGeom>
+          <a:noFill/>
+          <a:ln w="63500">
+            <a:prstDash val="sysDash"/>
+          </a:ln>
+        </p:spPr>
+        <p:style>
+          <a:lnRef idx="2">
+            <a:schemeClr val="accent1">
+              <a:shade val="50000"/>
+            </a:schemeClr>
+          </a:lnRef>
+          <a:fillRef idx="1">
+            <a:schemeClr val="accent1"/>
+          </a:fillRef>
+          <a:effectRef idx="0">
+            <a:schemeClr val="accent1"/>
+          </a:effectRef>
+          <a:fontRef idx="minor">
+            <a:schemeClr val="lt1"/>
+          </a:fontRef>
+        </p:style>
+        <p:txBody>
+          <a:bodyPr rtlCol="0" anchor="ctr"/>
+          <a:lstStyle/>
+          <a:p>
+            <a:pPr algn="ctr"/>
+            <a:endParaRPr lang="en-US"/>
+          </a:p>
+        </p:txBody>
+      </p:sp>
+    </p:spTree>
+    <p:extLst>
+      <p:ext uri="{BB962C8B-B14F-4D97-AF65-F5344CB8AC3E}">
+        <p14:creationId xmlns:p14="http://schemas.microsoft.com/office/powerpoint/2010/main" val="1829782052"/>
+      </p:ext>
+    </p:extLst>
+  </p:cSld>
+  <p:clrMapOvr>
+    <a:masterClrMapping/>
+  </p:clrMapOvr>
+  <p:timing>
+    <p:tnLst>
+      <p:par>
+        <p:cTn id="1" dur="indefinite" restart="never" nodeType="tmRoot"/>
+      </p:par>
+    </p:tnLst>
+  </p:timing>
+</p:sld>
+</file>
+
+<file path=ppt/slides/slide11.xml><?xml version="1.0" encoding="utf-8"?>
+<p:sld xmlns:a="http://schemas.openxmlformats.org/drawingml/2006/main" xmlns:r="http://schemas.openxmlformats.org/officeDocument/2006/relationships" xmlns:p="http://schemas.openxmlformats.org/presentationml/2006/main">
+  <p:cSld>
+    <p:spTree>
+      <p:nvGrpSpPr>
+        <p:cNvPr id="1" name=""/>
+        <p:cNvGrpSpPr/>
+        <p:nvPr/>
+      </p:nvGrpSpPr>
+      <p:grpSpPr>
+        <a:xfrm>
+          <a:off x="0" y="0"/>
+          <a:ext cx="0" cy="0"/>
+          <a:chOff x="0" y="0"/>
+          <a:chExt cx="0" cy="0"/>
+        </a:xfrm>
+      </p:grpSpPr>
+      <p:sp>
+        <p:nvSpPr>
+          <p:cNvPr id="2" name="Title 1">
+            <a:extLst>
+              <a:ext uri="{FF2B5EF4-FFF2-40B4-BE49-F238E27FC236}">
+                <a16:creationId xmlns:a16="http://schemas.microsoft.com/office/drawing/2014/main" id="{ECED6C5E-F160-BB45-A245-FCB61D79379A}"/>
+              </a:ext>
+            </a:extLst>
+          </p:cNvPr>
+          <p:cNvSpPr>
+            <a:spLocks noGrp="1"/>
+          </p:cNvSpPr>
+          <p:nvPr>
+            <p:ph type="title"/>
+          </p:nvPr>
+        </p:nvSpPr>
+        <p:spPr>
+          <a:xfrm>
+            <a:off x="2592925" y="624110"/>
+            <a:ext cx="8911687" cy="1140296"/>
+          </a:xfrm>
+        </p:spPr>
+        <p:txBody>
+          <a:bodyPr>
+            <a:normAutofit fontScale="90000"/>
+          </a:bodyPr>
+          <a:lstStyle/>
+          <a:p>
+            <a:r>
+              <a:rPr lang="en-US" sz="4800" dirty="0"/>
+              <a:t>4. Analysis</a:t>
+            </a:r>
+            <a:br>
+              <a:rPr lang="en-US" sz="4800" dirty="0"/>
+            </a:br>
+            <a:r>
+              <a:rPr lang="en-US" sz="4000" dirty="0">
+                <a:solidFill>
+                  <a:schemeClr val="accent2">
+                    <a:lumMod val="75000"/>
+                  </a:schemeClr>
+                </a:solidFill>
+              </a:rPr>
+              <a:t>4.2  Cluster </a:t>
+            </a:r>
+            <a:r>
+              <a:rPr lang="en-US" sz="4000" dirty="0" smtClean="0">
+                <a:solidFill>
+                  <a:schemeClr val="accent2">
+                    <a:lumMod val="75000"/>
+                  </a:schemeClr>
+                </a:solidFill>
+              </a:rPr>
+              <a:t>Project</a:t>
+            </a:r>
+            <a:r>
+              <a:rPr lang="en-US" sz="4000" dirty="0">
+                <a:solidFill>
+                  <a:schemeClr val="accent2">
+                    <a:lumMod val="75000"/>
+                  </a:schemeClr>
+                </a:solidFill>
+              </a:rPr>
+              <a:t/>
+            </a:r>
+            <a:br>
+              <a:rPr lang="en-US" sz="4000" dirty="0">
+                <a:solidFill>
+                  <a:schemeClr val="accent2">
+                    <a:lumMod val="75000"/>
+                  </a:schemeClr>
+                </a:solidFill>
+              </a:rPr>
+            </a:br>
+            <a:endParaRPr lang="en-US" sz="2800" cap="all" dirty="0"/>
+          </a:p>
+        </p:txBody>
+      </p:sp>
+      <p:sp>
+        <p:nvSpPr>
+          <p:cNvPr id="5" name="TextBox 4"/>
+          <p:cNvSpPr txBox="1"/>
+          <p:nvPr/>
+        </p:nvSpPr>
+        <p:spPr>
+          <a:xfrm>
+            <a:off x="2592925" y="1884471"/>
+            <a:ext cx="10187188" cy="369332"/>
+          </a:xfrm>
+          <a:prstGeom prst="rect">
+            <a:avLst/>
+          </a:prstGeom>
+          <a:noFill/>
+        </p:spPr>
+        <p:txBody>
+          <a:bodyPr wrap="square" rtlCol="0">
+            <a:spAutoFit/>
+          </a:bodyPr>
+          <a:lstStyle/>
+          <a:p>
+            <a:r>
+              <a:rPr lang="en-US" cap="all" dirty="0"/>
+              <a:t>Best K with </a:t>
+            </a:r>
+            <a:r>
+              <a:rPr lang="en-US" b="1" cap="all" dirty="0" smtClean="0">
+                <a:solidFill>
+                  <a:schemeClr val="accent2">
+                    <a:lumMod val="75000"/>
+                  </a:schemeClr>
+                </a:solidFill>
+              </a:rPr>
+              <a:t>Elbow criterion</a:t>
+            </a:r>
+            <a:endParaRPr lang="en-US" b="1" cap="all" dirty="0">
+              <a:solidFill>
+                <a:schemeClr val="accent2">
+                  <a:lumMod val="75000"/>
+                </a:schemeClr>
+              </a:solidFill>
+            </a:endParaRPr>
+          </a:p>
+        </p:txBody>
+      </p:sp>
+      <p:pic>
+        <p:nvPicPr>
+          <p:cNvPr id="6" name="Picture 5"/>
+          <p:cNvPicPr>
+            <a:picLocks noChangeAspect="1"/>
+          </p:cNvPicPr>
+          <p:nvPr/>
+        </p:nvPicPr>
+        <p:blipFill>
+          <a:blip r:embed="rId2"/>
+          <a:stretch>
+            <a:fillRect/>
+          </a:stretch>
+        </p:blipFill>
+        <p:spPr>
+          <a:xfrm>
+            <a:off x="2592925" y="2475158"/>
+            <a:ext cx="7220776" cy="4240285"/>
+          </a:xfrm>
+          <a:prstGeom prst="rect">
+            <a:avLst/>
+          </a:prstGeom>
+        </p:spPr>
+      </p:pic>
+    </p:spTree>
+    <p:extLst>
+      <p:ext uri="{BB962C8B-B14F-4D97-AF65-F5344CB8AC3E}">
+        <p14:creationId xmlns:p14="http://schemas.microsoft.com/office/powerpoint/2010/main" val="489087260"/>
+      </p:ext>
+    </p:extLst>
+  </p:cSld>
+  <p:clrMapOvr>
+    <a:masterClrMapping/>
+  </p:clrMapOvr>
+  <p:timing>
+    <p:tnLst>
+      <p:par>
+        <p:cTn id="1" dur="indefinite" restart="never" nodeType="tmRoot"/>
+      </p:par>
+    </p:tnLst>
+  </p:timing>
+</p:sld>
+</file>
+
+<file path=ppt/slides/slide12.xml><?xml version="1.0" encoding="utf-8"?>
+<p:sld xmlns:a="http://schemas.openxmlformats.org/drawingml/2006/main" xmlns:r="http://schemas.openxmlformats.org/officeDocument/2006/relationships" xmlns:p="http://schemas.openxmlformats.org/presentationml/2006/main">
+  <p:cSld>
+    <p:spTree>
+      <p:nvGrpSpPr>
+        <p:cNvPr id="1" name=""/>
+        <p:cNvGrpSpPr/>
+        <p:nvPr/>
+      </p:nvGrpSpPr>
+      <p:grpSpPr>
+        <a:xfrm>
+          <a:off x="0" y="0"/>
+          <a:ext cx="0" cy="0"/>
+          <a:chOff x="0" y="0"/>
+          <a:chExt cx="0" cy="0"/>
+        </a:xfrm>
+      </p:grpSpPr>
+      <p:sp>
+        <p:nvSpPr>
+          <p:cNvPr id="2" name="Title 1">
+            <a:extLst>
+              <a:ext uri="{FF2B5EF4-FFF2-40B4-BE49-F238E27FC236}">
+                <a16:creationId xmlns:a16="http://schemas.microsoft.com/office/drawing/2014/main" id="{ECED6C5E-F160-BB45-A245-FCB61D79379A}"/>
+              </a:ext>
+            </a:extLst>
+          </p:cNvPr>
+          <p:cNvSpPr>
+            <a:spLocks noGrp="1"/>
+          </p:cNvSpPr>
+          <p:nvPr>
+            <p:ph type="title"/>
+          </p:nvPr>
+        </p:nvSpPr>
+        <p:spPr>
+          <a:xfrm>
+            <a:off x="2592925" y="624110"/>
+            <a:ext cx="8911687" cy="1140296"/>
+          </a:xfrm>
+        </p:spPr>
+        <p:txBody>
+          <a:bodyPr>
+            <a:normAutofit fontScale="90000"/>
+          </a:bodyPr>
+          <a:lstStyle/>
+          <a:p>
+            <a:r>
+              <a:rPr lang="en-US" sz="4800" dirty="0"/>
+              <a:t>4. Analysis</a:t>
+            </a:r>
+            <a:br>
+              <a:rPr lang="en-US" sz="4800" dirty="0"/>
+            </a:br>
+            <a:r>
+              <a:rPr lang="en-US" sz="4000" dirty="0">
+                <a:solidFill>
+                  <a:schemeClr val="accent2">
+                    <a:lumMod val="75000"/>
+                  </a:schemeClr>
+                </a:solidFill>
+              </a:rPr>
+              <a:t>4.2  Cluster </a:t>
+            </a:r>
+            <a:r>
+              <a:rPr lang="en-US" sz="4000" dirty="0" smtClean="0">
+                <a:solidFill>
+                  <a:schemeClr val="accent2">
+                    <a:lumMod val="75000"/>
+                  </a:schemeClr>
+                </a:solidFill>
+              </a:rPr>
+              <a:t>Project</a:t>
+            </a:r>
+            <a:r>
+              <a:rPr lang="en-US" sz="4000" dirty="0">
+                <a:solidFill>
+                  <a:schemeClr val="accent2">
+                    <a:lumMod val="75000"/>
+                  </a:schemeClr>
+                </a:solidFill>
+              </a:rPr>
+              <a:t/>
+            </a:r>
+            <a:br>
+              <a:rPr lang="en-US" sz="4000" dirty="0">
+                <a:solidFill>
+                  <a:schemeClr val="accent2">
+                    <a:lumMod val="75000"/>
+                  </a:schemeClr>
+                </a:solidFill>
+              </a:rPr>
+            </a:br>
+            <a:endParaRPr lang="en-US" sz="2800" cap="all" dirty="0"/>
+          </a:p>
+        </p:txBody>
+      </p:sp>
+      <p:sp>
+        <p:nvSpPr>
+          <p:cNvPr id="5" name="TextBox 4"/>
+          <p:cNvSpPr txBox="1"/>
+          <p:nvPr/>
+        </p:nvSpPr>
+        <p:spPr>
+          <a:xfrm>
+            <a:off x="2592925" y="1884471"/>
+            <a:ext cx="10187188" cy="369332"/>
+          </a:xfrm>
+          <a:prstGeom prst="rect">
+            <a:avLst/>
+          </a:prstGeom>
+          <a:noFill/>
+        </p:spPr>
+        <p:txBody>
+          <a:bodyPr wrap="square" rtlCol="0">
+            <a:spAutoFit/>
+          </a:bodyPr>
+          <a:lstStyle/>
+          <a:p>
+            <a:r>
+              <a:rPr lang="en-US" cap="all" dirty="0"/>
+              <a:t>Merged table with cluster labels</a:t>
+            </a:r>
+            <a:endParaRPr lang="en-US" cap="all" dirty="0"/>
+          </a:p>
+        </p:txBody>
+      </p:sp>
+      <p:pic>
+        <p:nvPicPr>
+          <p:cNvPr id="3" name="Picture 2"/>
+          <p:cNvPicPr>
+            <a:picLocks noChangeAspect="1"/>
+          </p:cNvPicPr>
+          <p:nvPr/>
+        </p:nvPicPr>
+        <p:blipFill>
+          <a:blip r:embed="rId2"/>
+          <a:stretch>
+            <a:fillRect/>
+          </a:stretch>
+        </p:blipFill>
+        <p:spPr>
+          <a:xfrm>
+            <a:off x="1003948" y="2489777"/>
+            <a:ext cx="11000159" cy="4052690"/>
+          </a:xfrm>
+          <a:prstGeom prst="rect">
+            <a:avLst/>
+          </a:prstGeom>
+        </p:spPr>
+      </p:pic>
+      <p:sp>
+        <p:nvSpPr>
+          <p:cNvPr id="4" name="Rectangle 3"/>
+          <p:cNvSpPr/>
+          <p:nvPr/>
+        </p:nvSpPr>
+        <p:spPr>
+          <a:xfrm>
+            <a:off x="5228823" y="2489777"/>
+            <a:ext cx="772732" cy="4052690"/>
+          </a:xfrm>
+          <a:prstGeom prst="rect">
+            <a:avLst/>
+          </a:prstGeom>
+          <a:noFill/>
+          <a:ln w="63500">
+            <a:prstDash val="dash"/>
+          </a:ln>
+        </p:spPr>
+        <p:style>
+          <a:lnRef idx="2">
+            <a:schemeClr val="accent1">
+              <a:shade val="50000"/>
+            </a:schemeClr>
+          </a:lnRef>
+          <a:fillRef idx="1">
+            <a:schemeClr val="accent1"/>
+          </a:fillRef>
+          <a:effectRef idx="0">
+            <a:schemeClr val="accent1"/>
+          </a:effectRef>
+          <a:fontRef idx="minor">
+            <a:schemeClr val="lt1"/>
+          </a:fontRef>
+        </p:style>
+        <p:txBody>
+          <a:bodyPr rtlCol="0" anchor="ctr"/>
+          <a:lstStyle/>
+          <a:p>
+            <a:pPr algn="ctr"/>
+            <a:endParaRPr lang="en-US"/>
+          </a:p>
+        </p:txBody>
+      </p:sp>
+    </p:spTree>
+    <p:extLst>
+      <p:ext uri="{BB962C8B-B14F-4D97-AF65-F5344CB8AC3E}">
+        <p14:creationId xmlns:p14="http://schemas.microsoft.com/office/powerpoint/2010/main" val="384867609"/>
+      </p:ext>
+    </p:extLst>
+  </p:cSld>
+  <p:clrMapOvr>
+    <a:masterClrMapping/>
+  </p:clrMapOvr>
+  <p:timing>
+    <p:tnLst>
+      <p:par>
+        <p:cTn id="1" dur="indefinite" restart="never" nodeType="tmRoot"/>
+      </p:par>
+    </p:tnLst>
+  </p:timing>
+</p:sld>
+</file>
+
+<file path=ppt/slides/slide13.xml><?xml version="1.0" encoding="utf-8"?>
+<p:sld xmlns:a="http://schemas.openxmlformats.org/drawingml/2006/main" xmlns:r="http://schemas.openxmlformats.org/officeDocument/2006/relationships" xmlns:p="http://schemas.openxmlformats.org/presentationml/2006/main">
+  <p:cSld>
+    <p:spTree>
+      <p:nvGrpSpPr>
+        <p:cNvPr id="1" name=""/>
+        <p:cNvGrpSpPr/>
+        <p:nvPr/>
+      </p:nvGrpSpPr>
+      <p:grpSpPr>
+        <a:xfrm>
+          <a:off x="0" y="0"/>
+          <a:ext cx="0" cy="0"/>
+          <a:chOff x="0" y="0"/>
+          <a:chExt cx="0" cy="0"/>
+        </a:xfrm>
+      </p:grpSpPr>
+      <p:sp>
+        <p:nvSpPr>
+          <p:cNvPr id="2" name="Title 1">
+            <a:extLst>
+              <a:ext uri="{FF2B5EF4-FFF2-40B4-BE49-F238E27FC236}">
+                <a16:creationId xmlns:a16="http://schemas.microsoft.com/office/drawing/2014/main" id="{ECED6C5E-F160-BB45-A245-FCB61D79379A}"/>
+              </a:ext>
+            </a:extLst>
+          </p:cNvPr>
+          <p:cNvSpPr>
+            <a:spLocks noGrp="1"/>
+          </p:cNvSpPr>
+          <p:nvPr>
+            <p:ph type="title"/>
+          </p:nvPr>
+        </p:nvSpPr>
+        <p:spPr>
+          <a:xfrm>
+            <a:off x="2592925" y="624110"/>
+            <a:ext cx="8911687" cy="1140296"/>
+          </a:xfrm>
+        </p:spPr>
+        <p:txBody>
+          <a:bodyPr>
+            <a:normAutofit fontScale="90000"/>
+          </a:bodyPr>
+          <a:lstStyle/>
+          <a:p>
+            <a:r>
+              <a:rPr lang="en-US" sz="4800" dirty="0"/>
+              <a:t>4. Analysis</a:t>
+            </a:r>
+            <a:br>
+              <a:rPr lang="en-US" sz="4800" dirty="0"/>
+            </a:br>
+            <a:r>
+              <a:rPr lang="en-US" sz="4000" dirty="0">
+                <a:solidFill>
+                  <a:schemeClr val="accent2">
+                    <a:lumMod val="75000"/>
+                  </a:schemeClr>
+                </a:solidFill>
+              </a:rPr>
+              <a:t>4.2  Cluster </a:t>
+            </a:r>
+            <a:r>
+              <a:rPr lang="en-US" sz="4000" dirty="0" smtClean="0">
+                <a:solidFill>
+                  <a:schemeClr val="accent2">
+                    <a:lumMod val="75000"/>
+                  </a:schemeClr>
+                </a:solidFill>
+              </a:rPr>
+              <a:t>Project</a:t>
+            </a:r>
+            <a:r>
+              <a:rPr lang="en-US" sz="4000" dirty="0">
+                <a:solidFill>
+                  <a:schemeClr val="accent2">
+                    <a:lumMod val="75000"/>
+                  </a:schemeClr>
+                </a:solidFill>
+              </a:rPr>
+              <a:t/>
+            </a:r>
+            <a:br>
+              <a:rPr lang="en-US" sz="4000" dirty="0">
+                <a:solidFill>
+                  <a:schemeClr val="accent2">
+                    <a:lumMod val="75000"/>
+                  </a:schemeClr>
+                </a:solidFill>
+              </a:rPr>
+            </a:br>
+            <a:endParaRPr lang="en-US" sz="2800" cap="all" dirty="0"/>
+          </a:p>
+        </p:txBody>
+      </p:sp>
+      <p:sp>
+        <p:nvSpPr>
+          <p:cNvPr id="5" name="TextBox 4"/>
+          <p:cNvSpPr txBox="1"/>
+          <p:nvPr/>
+        </p:nvSpPr>
+        <p:spPr>
+          <a:xfrm>
+            <a:off x="6932858" y="1501847"/>
+            <a:ext cx="5143232" cy="369332"/>
+          </a:xfrm>
+          <a:prstGeom prst="rect">
+            <a:avLst/>
+          </a:prstGeom>
+          <a:noFill/>
+        </p:spPr>
+        <p:txBody>
+          <a:bodyPr wrap="square" rtlCol="0">
+            <a:spAutoFit/>
+          </a:bodyPr>
+          <a:lstStyle/>
+          <a:p>
+            <a:r>
+              <a:rPr lang="en-US" dirty="0"/>
+              <a:t>Geographic details of each cluster</a:t>
+            </a:r>
+            <a:endParaRPr lang="en-US" dirty="0"/>
+          </a:p>
+        </p:txBody>
+      </p:sp>
+      <p:pic>
+        <p:nvPicPr>
+          <p:cNvPr id="6" name="Picture 5"/>
+          <p:cNvPicPr>
+            <a:picLocks noChangeAspect="1"/>
+          </p:cNvPicPr>
+          <p:nvPr/>
+        </p:nvPicPr>
+        <p:blipFill>
+          <a:blip r:embed="rId2"/>
+          <a:stretch>
+            <a:fillRect/>
+          </a:stretch>
+        </p:blipFill>
+        <p:spPr>
+          <a:xfrm>
+            <a:off x="265693" y="1990725"/>
+            <a:ext cx="8543925" cy="4867275"/>
+          </a:xfrm>
+          <a:prstGeom prst="rect">
+            <a:avLst/>
+          </a:prstGeom>
+        </p:spPr>
+      </p:pic>
+    </p:spTree>
+    <p:extLst>
+      <p:ext uri="{BB962C8B-B14F-4D97-AF65-F5344CB8AC3E}">
+        <p14:creationId xmlns:p14="http://schemas.microsoft.com/office/powerpoint/2010/main" val="966799450"/>
+      </p:ext>
+    </p:extLst>
+  </p:cSld>
+  <p:clrMapOvr>
+    <a:masterClrMapping/>
+  </p:clrMapOvr>
+  <p:timing>
+    <p:tnLst>
+      <p:par>
+        <p:cTn id="1" dur="indefinite" restart="never" nodeType="tmRoot"/>
+      </p:par>
+    </p:tnLst>
+  </p:timing>
+</p:sld>
+</file>
+
+<file path=ppt/slides/slide14.xml><?xml version="1.0" encoding="utf-8"?>
+<p:sld xmlns:a="http://schemas.openxmlformats.org/drawingml/2006/main" xmlns:r="http://schemas.openxmlformats.org/officeDocument/2006/relationships" xmlns:p="http://schemas.openxmlformats.org/presentationml/2006/main">
+  <p:cSld>
+    <p:spTree>
+      <p:nvGrpSpPr>
+        <p:cNvPr id="1" name=""/>
+        <p:cNvGrpSpPr/>
+        <p:nvPr/>
+      </p:nvGrpSpPr>
+      <p:grpSpPr>
+        <a:xfrm>
+          <a:off x="0" y="0"/>
+          <a:ext cx="0" cy="0"/>
+          <a:chOff x="0" y="0"/>
+          <a:chExt cx="0" cy="0"/>
+        </a:xfrm>
+      </p:grpSpPr>
+      <p:sp>
+        <p:nvSpPr>
+          <p:cNvPr id="2" name="Title 1">
+            <a:extLst>
+              <a:ext uri="{FF2B5EF4-FFF2-40B4-BE49-F238E27FC236}">
+                <a16:creationId xmlns:a16="http://schemas.microsoft.com/office/drawing/2014/main" id="{ECED6C5E-F160-BB45-A245-FCB61D79379A}"/>
+              </a:ext>
+            </a:extLst>
+          </p:cNvPr>
+          <p:cNvSpPr>
+            <a:spLocks noGrp="1"/>
+          </p:cNvSpPr>
+          <p:nvPr>
+            <p:ph type="title"/>
+          </p:nvPr>
+        </p:nvSpPr>
+        <p:spPr>
+          <a:xfrm>
+            <a:off x="2592925" y="624110"/>
+            <a:ext cx="8911687" cy="1140296"/>
+          </a:xfrm>
+        </p:spPr>
+        <p:txBody>
+          <a:bodyPr>
+            <a:normAutofit/>
+          </a:bodyPr>
+          <a:lstStyle/>
+          <a:p>
+            <a:r>
+              <a:rPr lang="en-US" sz="4300" dirty="0"/>
+              <a:t>5. Results and Discussion</a:t>
+            </a:r>
+          </a:p>
+        </p:txBody>
+      </p:sp>
+      <p:sp>
+        <p:nvSpPr>
+          <p:cNvPr id="5" name="TextBox 4"/>
+          <p:cNvSpPr txBox="1"/>
+          <p:nvPr/>
+        </p:nvSpPr>
+        <p:spPr>
+          <a:xfrm>
+            <a:off x="2592925" y="1215035"/>
+            <a:ext cx="9320033" cy="5578450"/>
+          </a:xfrm>
+          <a:prstGeom prst="rect">
+            <a:avLst/>
+          </a:prstGeom>
+          <a:noFill/>
+        </p:spPr>
+        <p:txBody>
+          <a:bodyPr wrap="square" rtlCol="0">
+            <a:spAutoFit/>
+          </a:bodyPr>
+          <a:lstStyle/>
+          <a:p>
+            <a:pPr marL="342900" indent="-342900">
+              <a:buFont typeface="+mj-lt"/>
+              <a:buAutoNum type="arabicPeriod"/>
+            </a:pPr>
+            <a:r>
+              <a:rPr lang="en-US" sz="1550" dirty="0"/>
+              <a:t>Cluster 1 contains 3 affordable rental projects, top 10 Most Common Venue mainly contains </a:t>
+            </a:r>
+            <a:r>
+              <a:rPr lang="en-US" sz="1550" dirty="0">
+                <a:solidFill>
+                  <a:schemeClr val="accent2">
+                    <a:lumMod val="75000"/>
+                  </a:schemeClr>
+                </a:solidFill>
+              </a:rPr>
+              <a:t>Playground/ Racetrack /Park /Football Stadium /Campground /Furniture / Home Store /Yoga Studio /Donut Shop /Dive Shop</a:t>
+            </a:r>
+            <a:r>
+              <a:rPr lang="en-US" sz="1550" dirty="0"/>
+              <a:t>, if the individual would like to have a fresh air and some quiet place for relax, these areas will be quite good</a:t>
+            </a:r>
+            <a:r>
+              <a:rPr lang="en-US" sz="1550" dirty="0" smtClean="0"/>
+              <a:t>.</a:t>
+            </a:r>
+          </a:p>
+          <a:p>
+            <a:pPr marL="342900" indent="-342900">
+              <a:buFont typeface="+mj-lt"/>
+              <a:buAutoNum type="arabicPeriod"/>
+            </a:pPr>
+            <a:r>
+              <a:rPr lang="en-US" sz="1550" dirty="0"/>
+              <a:t>Cluster 2 contains 33 affordable rental projects, this cluster contains most projects, top 10 Most Common Venue mainly contains </a:t>
+            </a:r>
+            <a:r>
+              <a:rPr lang="en-US" sz="1550" dirty="0">
+                <a:solidFill>
+                  <a:schemeClr val="accent2">
+                    <a:lumMod val="75000"/>
+                  </a:schemeClr>
+                </a:solidFill>
+              </a:rPr>
+              <a:t>Coffee Shop /Cocktail Bar /Nightclub /Gay Bar /Food Truck /Café /Motorcycle Shop /Thai Restaurant /Art Gallery /Furniture / Home Store </a:t>
+            </a:r>
+            <a:r>
+              <a:rPr lang="en-US" sz="1550" dirty="0"/>
+              <a:t>etc.., almost cover every aspect of our daily life, obviously, it will be very convenient to live in these </a:t>
+            </a:r>
+            <a:r>
+              <a:rPr lang="en-US" sz="1550" dirty="0" smtClean="0"/>
+              <a:t>areas.</a:t>
+            </a:r>
+          </a:p>
+          <a:p>
+            <a:pPr marL="342900" indent="-342900">
+              <a:buFont typeface="+mj-lt"/>
+              <a:buAutoNum type="arabicPeriod"/>
+            </a:pPr>
+            <a:r>
+              <a:rPr lang="en-US" sz="1550" dirty="0"/>
+              <a:t>Cluster 3 contains 3 affordable rental projects, top 10 Most Common Venue mainly contains </a:t>
+            </a:r>
+            <a:r>
+              <a:rPr lang="en-US" sz="1550" dirty="0">
+                <a:solidFill>
+                  <a:schemeClr val="accent2">
+                    <a:lumMod val="75000"/>
+                  </a:schemeClr>
+                </a:solidFill>
+              </a:rPr>
+              <a:t>Park /Skate Park /Bookstore /Brewery /Event Space /Donut Shop /Dumpling Restaurant /Electronics Store /English Restaurant /Ethiopian Restaurant</a:t>
+            </a:r>
+            <a:r>
+              <a:rPr lang="en-US" sz="1550" dirty="0"/>
+              <a:t>, it seems like these are community areas, living facilities are too simple here, but it may be good for those who work here</a:t>
+            </a:r>
+            <a:r>
+              <a:rPr lang="en-US" sz="1550" dirty="0" smtClean="0"/>
+              <a:t>.</a:t>
+            </a:r>
+          </a:p>
+          <a:p>
+            <a:pPr marL="342900" indent="-342900">
+              <a:buFont typeface="+mj-lt"/>
+              <a:buAutoNum type="arabicPeriod"/>
+            </a:pPr>
+            <a:r>
+              <a:rPr lang="en-US" sz="1550" dirty="0"/>
+              <a:t>Cluster 4 contains 32 affordable rental projects, top 10 Most Common Venue mainly contains </a:t>
+            </a:r>
+            <a:r>
+              <a:rPr lang="en-US" sz="1550" dirty="0">
+                <a:solidFill>
+                  <a:schemeClr val="accent2">
+                    <a:lumMod val="75000"/>
+                  </a:schemeClr>
+                </a:solidFill>
+              </a:rPr>
+              <a:t>Art Coffee Shop /Gay Bar /Gym /Sushi Restaurant /Grocery Store /Asian Restaurant /Sandwich Place /Café /Pet Store</a:t>
+            </a:r>
+            <a:r>
+              <a:rPr lang="en-US" sz="1550" dirty="0"/>
+              <a:t>, it look like this cluster is a food areas which suitable for teenage. Their can try new food here and explore new culture such as Gay Bar or some Art Coffee </a:t>
+            </a:r>
+            <a:r>
+              <a:rPr lang="en-US" sz="1550" dirty="0" smtClean="0"/>
+              <a:t>Shop</a:t>
+            </a:r>
+          </a:p>
+          <a:p>
+            <a:pPr marL="342900" indent="-342900">
+              <a:buFont typeface="+mj-lt"/>
+              <a:buAutoNum type="arabicPeriod"/>
+            </a:pPr>
+            <a:r>
+              <a:rPr lang="en-US" sz="1550" dirty="0"/>
+              <a:t>Cluster 5 contains 1 affordable rental projects, this cluster contains most projects, top 10 Most Common Venue mainly contains </a:t>
+            </a:r>
+            <a:r>
+              <a:rPr lang="en-US" sz="1550" dirty="0" smtClean="0">
+                <a:solidFill>
+                  <a:schemeClr val="accent2">
+                    <a:lumMod val="75000"/>
+                  </a:schemeClr>
+                </a:solidFill>
+              </a:rPr>
+              <a:t>Playground /Mountain Park /Yoga Studio /English Restaurant /Doctor's Office /Dog Run /Donut Shop /Dumpling Restaurant /Electronics Store </a:t>
+            </a:r>
+            <a:r>
+              <a:rPr lang="en-US" sz="1550" dirty="0" smtClean="0"/>
+              <a:t>etc</a:t>
+            </a:r>
+            <a:r>
+              <a:rPr lang="en-US" sz="1550" dirty="0"/>
+              <a:t>.., living facilities are too simple here, but it may be good for those who work here.</a:t>
+            </a:r>
+            <a:endParaRPr lang="en-US" sz="1550" dirty="0"/>
+          </a:p>
+        </p:txBody>
+      </p:sp>
+    </p:spTree>
+    <p:extLst>
+      <p:ext uri="{BB962C8B-B14F-4D97-AF65-F5344CB8AC3E}">
+        <p14:creationId xmlns:p14="http://schemas.microsoft.com/office/powerpoint/2010/main" val="3477201064"/>
+      </p:ext>
+    </p:extLst>
+  </p:cSld>
+  <p:clrMapOvr>
+    <a:masterClrMapping/>
+  </p:clrMapOvr>
+  <p:timing>
+    <p:tnLst>
+      <p:par>
+        <p:cTn id="1" dur="indefinite" restart="never" nodeType="tmRoot"/>
+      </p:par>
+    </p:tnLst>
+  </p:timing>
+</p:sld>
+</file>
+
+<file path=ppt/slides/slide15.xml><?xml version="1.0" encoding="utf-8"?>
+<p:sld xmlns:a="http://schemas.openxmlformats.org/drawingml/2006/main" xmlns:r="http://schemas.openxmlformats.org/officeDocument/2006/relationships" xmlns:p="http://schemas.openxmlformats.org/presentationml/2006/main">
+  <p:cSld>
+    <p:spTree>
+      <p:nvGrpSpPr>
+        <p:cNvPr id="1" name=""/>
+        <p:cNvGrpSpPr/>
+        <p:nvPr/>
+      </p:nvGrpSpPr>
+      <p:grpSpPr>
+        <a:xfrm>
+          <a:off x="0" y="0"/>
+          <a:ext cx="0" cy="0"/>
+          <a:chOff x="0" y="0"/>
+          <a:chExt cx="0" cy="0"/>
+        </a:xfrm>
+      </p:grpSpPr>
+      <p:sp>
+        <p:nvSpPr>
+          <p:cNvPr id="2" name="Title 1">
+            <a:extLst>
+              <a:ext uri="{FF2B5EF4-FFF2-40B4-BE49-F238E27FC236}">
+                <a16:creationId xmlns:a16="http://schemas.microsoft.com/office/drawing/2014/main" id="{ECED6C5E-F160-BB45-A245-FCB61D79379A}"/>
+              </a:ext>
+            </a:extLst>
+          </p:cNvPr>
+          <p:cNvSpPr>
+            <a:spLocks noGrp="1"/>
+          </p:cNvSpPr>
+          <p:nvPr>
+            <p:ph type="title"/>
+          </p:nvPr>
+        </p:nvSpPr>
+        <p:spPr>
+          <a:xfrm>
+            <a:off x="2592925" y="624110"/>
+            <a:ext cx="8911687" cy="1140296"/>
+          </a:xfrm>
+        </p:spPr>
+        <p:txBody>
+          <a:bodyPr>
+            <a:normAutofit/>
+          </a:bodyPr>
+          <a:lstStyle/>
+          <a:p>
+            <a:r>
+              <a:rPr lang="en-US" sz="4300" dirty="0" smtClean="0"/>
+              <a:t>5. Conclusion</a:t>
+            </a:r>
+            <a:endParaRPr lang="en-US" sz="4300" dirty="0"/>
+          </a:p>
+        </p:txBody>
+      </p:sp>
+      <p:sp>
+        <p:nvSpPr>
+          <p:cNvPr id="3" name="TextBox 2"/>
+          <p:cNvSpPr txBox="1"/>
+          <p:nvPr/>
+        </p:nvSpPr>
+        <p:spPr>
+          <a:xfrm>
+            <a:off x="965915" y="1764406"/>
+            <a:ext cx="10728102" cy="3970318"/>
+          </a:xfrm>
+          <a:prstGeom prst="rect">
+            <a:avLst/>
+          </a:prstGeom>
+          <a:noFill/>
+        </p:spPr>
+        <p:txBody>
+          <a:bodyPr wrap="square" rtlCol="0">
+            <a:spAutoFit/>
+          </a:bodyPr>
+          <a:lstStyle/>
+          <a:p>
+            <a:pPr marL="342900" indent="-342900">
+              <a:buFont typeface="+mj-lt"/>
+              <a:buAutoNum type="arabicPeriod"/>
+            </a:pPr>
+            <a:r>
+              <a:rPr lang="en-US" dirty="0"/>
+              <a:t>Purpose of this project is try to find a category of optimal affordable Rental projects with better living facilities. Target to individuals who want to travel to San Francisco for business or holiday with a limit budget. As it is widely believed that a most of residential areas should be equipped with a range of living facilities, such as restaurants/gyms/markets/hospitals etc... </a:t>
+            </a:r>
+            <a:endParaRPr lang="en-US" dirty="0" smtClean="0"/>
+          </a:p>
+          <a:p>
+            <a:pPr marL="342900" indent="-342900">
+              <a:buFont typeface="+mj-lt"/>
+              <a:buAutoNum type="arabicPeriod"/>
+            </a:pPr>
+            <a:r>
+              <a:rPr lang="en-US" dirty="0"/>
+              <a:t>The Foursquare location data was leveraged to compare each project to provide reliable suggestions for individuals who want to choose some place with better living facilities. </a:t>
+            </a:r>
+            <a:endParaRPr lang="en-US" dirty="0" smtClean="0"/>
+          </a:p>
+          <a:p>
+            <a:pPr marL="342900" indent="-342900">
+              <a:buFont typeface="+mj-lt"/>
+              <a:buAutoNum type="arabicPeriod"/>
+            </a:pPr>
+            <a:r>
+              <a:rPr lang="en-US" dirty="0" smtClean="0"/>
+              <a:t>With </a:t>
+            </a:r>
+            <a:r>
+              <a:rPr lang="en-US" dirty="0"/>
+              <a:t>unsupervised learning K-means algorithm, all the affordable Rental projects were clustered in to 5 categories, the advantages of each category was expressed to help individuals choose their best </a:t>
+            </a:r>
+            <a:r>
+              <a:rPr lang="en-US" dirty="0" smtClean="0"/>
+              <a:t>one</a:t>
+            </a:r>
+          </a:p>
+          <a:p>
+            <a:pPr marL="342900" indent="-342900">
+              <a:buFont typeface="+mj-lt"/>
+              <a:buAutoNum type="arabicPeriod"/>
+            </a:pPr>
+            <a:r>
+              <a:rPr lang="en-US" dirty="0"/>
+              <a:t>This Project </a:t>
+            </a:r>
+            <a:r>
+              <a:rPr lang="en-US" dirty="0" smtClean="0"/>
+              <a:t>simply </a:t>
+            </a:r>
+            <a:r>
+              <a:rPr lang="en-US" dirty="0"/>
+              <a:t>processed the Rental affordable housing programs data, and cluster them into 5 </a:t>
+            </a:r>
+            <a:r>
+              <a:rPr lang="en-US" dirty="0" smtClean="0"/>
+              <a:t>categories </a:t>
+            </a:r>
+            <a:r>
+              <a:rPr lang="en-US" dirty="0"/>
+              <a:t>based one the living facilities data, the results can only help individuals choose the place they want to rent with affordable price and better living facilities. Further </a:t>
+            </a:r>
+            <a:r>
+              <a:rPr lang="en-US" dirty="0" smtClean="0"/>
+              <a:t>analysis </a:t>
+            </a:r>
+            <a:r>
+              <a:rPr lang="en-US" dirty="0"/>
+              <a:t>can be done base on these 5 clusters, which can help provide more detail information to clarify the advantages of each category.</a:t>
+            </a:r>
+          </a:p>
+        </p:txBody>
+      </p:sp>
+    </p:spTree>
+    <p:extLst>
+      <p:ext uri="{BB962C8B-B14F-4D97-AF65-F5344CB8AC3E}">
+        <p14:creationId xmlns:p14="http://schemas.microsoft.com/office/powerpoint/2010/main" val="1362515484"/>
+      </p:ext>
+    </p:extLst>
+  </p:cSld>
+  <p:clrMapOvr>
+    <a:masterClrMapping/>
+  </p:clrMapOvr>
+  <p:timing>
+    <p:tnLst>
+      <p:par>
+        <p:cTn id="1" dur="indefinite" restart="never" nodeType="tmRoot"/>
+      </p:par>
+    </p:tnLst>
+  </p:timing>
+</p:sld>
+</file>
+
 <file path=ppt/slides/slide2.xml><?xml version="1.0" encoding="utf-8"?>
 <p:sld xmlns:a="http://schemas.openxmlformats.org/drawingml/2006/main" xmlns:r="http://schemas.openxmlformats.org/officeDocument/2006/relationships" xmlns:p="http://schemas.openxmlformats.org/presentationml/2006/main">
   <p:cSld>
@@ -9272,6 +10434,371 @@
     <p:extLst>
       <p:ext uri="{BB962C8B-B14F-4D97-AF65-F5344CB8AC3E}">
         <p14:creationId xmlns:p14="http://schemas.microsoft.com/office/powerpoint/2010/main" val="1018209400"/>
+      </p:ext>
+    </p:extLst>
+  </p:cSld>
+  <p:clrMapOvr>
+    <a:masterClrMapping/>
+  </p:clrMapOvr>
+  <p:timing>
+    <p:tnLst>
+      <p:par>
+        <p:cTn id="1" dur="indefinite" restart="never" nodeType="tmRoot"/>
+      </p:par>
+    </p:tnLst>
+  </p:timing>
+</p:sld>
+</file>
+
+<file path=ppt/slides/slide8.xml><?xml version="1.0" encoding="utf-8"?>
+<p:sld xmlns:a="http://schemas.openxmlformats.org/drawingml/2006/main" xmlns:r="http://schemas.openxmlformats.org/officeDocument/2006/relationships" xmlns:p="http://schemas.openxmlformats.org/presentationml/2006/main">
+  <p:cSld>
+    <p:spTree>
+      <p:nvGrpSpPr>
+        <p:cNvPr id="1" name=""/>
+        <p:cNvGrpSpPr/>
+        <p:nvPr/>
+      </p:nvGrpSpPr>
+      <p:grpSpPr>
+        <a:xfrm>
+          <a:off x="0" y="0"/>
+          <a:ext cx="0" cy="0"/>
+          <a:chOff x="0" y="0"/>
+          <a:chExt cx="0" cy="0"/>
+        </a:xfrm>
+      </p:grpSpPr>
+      <p:sp>
+        <p:nvSpPr>
+          <p:cNvPr id="2" name="Title 1">
+            <a:extLst>
+              <a:ext uri="{FF2B5EF4-FFF2-40B4-BE49-F238E27FC236}">
+                <a16:creationId xmlns:a16="http://schemas.microsoft.com/office/drawing/2014/main" id="{ECED6C5E-F160-BB45-A245-FCB61D79379A}"/>
+              </a:ext>
+            </a:extLst>
+          </p:cNvPr>
+          <p:cNvSpPr>
+            <a:spLocks noGrp="1"/>
+          </p:cNvSpPr>
+          <p:nvPr>
+            <p:ph type="title"/>
+          </p:nvPr>
+        </p:nvSpPr>
+        <p:spPr>
+          <a:xfrm>
+            <a:off x="2592925" y="624110"/>
+            <a:ext cx="8911687" cy="728172"/>
+          </a:xfrm>
+        </p:spPr>
+        <p:txBody>
+          <a:bodyPr/>
+          <a:lstStyle/>
+          <a:p>
+            <a:r>
+              <a:rPr lang="en-US" dirty="0" smtClean="0"/>
+              <a:t>3</a:t>
+            </a:r>
+            <a:r>
+              <a:rPr lang="en-US" dirty="0"/>
+              <a:t>. </a:t>
+            </a:r>
+            <a:r>
+              <a:rPr lang="en-US" dirty="0" smtClean="0"/>
+              <a:t>Methodology</a:t>
+            </a:r>
+            <a:endParaRPr lang="en-US" dirty="0"/>
+          </a:p>
+        </p:txBody>
+      </p:sp>
+      <p:sp>
+        <p:nvSpPr>
+          <p:cNvPr id="3" name="Content Placeholder 2">
+            <a:extLst>
+              <a:ext uri="{FF2B5EF4-FFF2-40B4-BE49-F238E27FC236}">
+                <a16:creationId xmlns:a16="http://schemas.microsoft.com/office/drawing/2014/main" id="{A18F9EDA-A330-1A4C-AD09-61824E6E485B}"/>
+              </a:ext>
+            </a:extLst>
+          </p:cNvPr>
+          <p:cNvSpPr>
+            <a:spLocks noGrp="1"/>
+          </p:cNvSpPr>
+          <p:nvPr>
+            <p:ph idx="1"/>
+          </p:nvPr>
+        </p:nvSpPr>
+        <p:spPr>
+          <a:xfrm>
+            <a:off x="2592925" y="1489657"/>
+            <a:ext cx="8915400" cy="3777622"/>
+          </a:xfrm>
+        </p:spPr>
+        <p:txBody>
+          <a:bodyPr/>
+          <a:lstStyle/>
+          <a:p>
+            <a:pPr lvl="0">
+              <a:buFont typeface="+mj-lt"/>
+              <a:buAutoNum type="arabicPeriod"/>
+            </a:pPr>
+            <a:r>
+              <a:rPr lang="en-US" dirty="0"/>
+              <a:t>The first step should be defined the business problem, we already have done that in </a:t>
+            </a:r>
+            <a:r>
+              <a:rPr lang="en-US" dirty="0" smtClean="0"/>
+              <a:t>Introduction</a:t>
+            </a:r>
+          </a:p>
+          <a:p>
+            <a:pPr>
+              <a:buFont typeface="+mj-lt"/>
+              <a:buAutoNum type="arabicPeriod"/>
+            </a:pPr>
+            <a:r>
+              <a:rPr lang="en-US" dirty="0"/>
+              <a:t>The second step should be downloaded the data and explore it, as we have done in Data</a:t>
+            </a:r>
+          </a:p>
+          <a:p>
+            <a:pPr>
+              <a:buFont typeface="+mj-lt"/>
+              <a:buAutoNum type="arabicPeriod"/>
+            </a:pPr>
+            <a:r>
+              <a:rPr lang="en-US" dirty="0"/>
+              <a:t>The Third step is to explore neighborhoods of each affordable housing projects in San Francisco with Foursquare API</a:t>
+            </a:r>
+          </a:p>
+          <a:p>
+            <a:pPr>
+              <a:buFont typeface="+mj-lt"/>
+              <a:buAutoNum type="arabicPeriod"/>
+            </a:pPr>
+            <a:r>
+              <a:rPr lang="en-US" dirty="0"/>
+              <a:t>The final step, cluster the all the affordable housing projects with K-means &amp; visualize geographic details of each </a:t>
+            </a:r>
+            <a:r>
+              <a:rPr lang="en-US" dirty="0" smtClean="0"/>
+              <a:t>cluster</a:t>
+            </a:r>
+            <a:endParaRPr lang="en-US" dirty="0"/>
+          </a:p>
+        </p:txBody>
+      </p:sp>
+    </p:spTree>
+    <p:extLst>
+      <p:ext uri="{BB962C8B-B14F-4D97-AF65-F5344CB8AC3E}">
+        <p14:creationId xmlns:p14="http://schemas.microsoft.com/office/powerpoint/2010/main" val="2189681657"/>
+      </p:ext>
+    </p:extLst>
+  </p:cSld>
+  <p:clrMapOvr>
+    <a:masterClrMapping/>
+  </p:clrMapOvr>
+  <p:timing>
+    <p:tnLst>
+      <p:par>
+        <p:cTn id="1" dur="indefinite" restart="never" nodeType="tmRoot"/>
+      </p:par>
+    </p:tnLst>
+  </p:timing>
+</p:sld>
+</file>
+
+<file path=ppt/slides/slide9.xml><?xml version="1.0" encoding="utf-8"?>
+<p:sld xmlns:a="http://schemas.openxmlformats.org/drawingml/2006/main" xmlns:r="http://schemas.openxmlformats.org/officeDocument/2006/relationships" xmlns:p="http://schemas.openxmlformats.org/presentationml/2006/main">
+  <p:cSld>
+    <p:spTree>
+      <p:nvGrpSpPr>
+        <p:cNvPr id="1" name=""/>
+        <p:cNvGrpSpPr/>
+        <p:nvPr/>
+      </p:nvGrpSpPr>
+      <p:grpSpPr>
+        <a:xfrm>
+          <a:off x="0" y="0"/>
+          <a:ext cx="0" cy="0"/>
+          <a:chOff x="0" y="0"/>
+          <a:chExt cx="0" cy="0"/>
+        </a:xfrm>
+      </p:grpSpPr>
+      <p:sp>
+        <p:nvSpPr>
+          <p:cNvPr id="2" name="Title 1">
+            <a:extLst>
+              <a:ext uri="{FF2B5EF4-FFF2-40B4-BE49-F238E27FC236}">
+                <a16:creationId xmlns:a16="http://schemas.microsoft.com/office/drawing/2014/main" id="{ECED6C5E-F160-BB45-A245-FCB61D79379A}"/>
+              </a:ext>
+            </a:extLst>
+          </p:cNvPr>
+          <p:cNvSpPr>
+            <a:spLocks noGrp="1"/>
+          </p:cNvSpPr>
+          <p:nvPr>
+            <p:ph type="title"/>
+          </p:nvPr>
+        </p:nvSpPr>
+        <p:spPr>
+          <a:xfrm>
+            <a:off x="2592925" y="624110"/>
+            <a:ext cx="8911687" cy="1140296"/>
+          </a:xfrm>
+        </p:spPr>
+        <p:txBody>
+          <a:bodyPr>
+            <a:normAutofit fontScale="90000"/>
+          </a:bodyPr>
+          <a:lstStyle/>
+          <a:p>
+            <a:r>
+              <a:rPr lang="en-US" sz="4000" dirty="0"/>
+              <a:t>4. Analysis</a:t>
+            </a:r>
+            <a:r>
+              <a:rPr lang="en-US" sz="3200" dirty="0"/>
+              <a:t/>
+            </a:r>
+            <a:br>
+              <a:rPr lang="en-US" sz="3200" dirty="0"/>
+            </a:br>
+            <a:r>
+              <a:rPr lang="en-US" dirty="0">
+                <a:solidFill>
+                  <a:schemeClr val="accent2">
+                    <a:lumMod val="75000"/>
+                  </a:schemeClr>
+                </a:solidFill>
+              </a:rPr>
+              <a:t>4.1 Analyze Each </a:t>
+            </a:r>
+            <a:r>
+              <a:rPr lang="en-US" dirty="0" smtClean="0">
+                <a:solidFill>
+                  <a:schemeClr val="accent2">
+                    <a:lumMod val="75000"/>
+                  </a:schemeClr>
+                </a:solidFill>
+              </a:rPr>
+              <a:t>Project</a:t>
+            </a:r>
+            <a:br>
+              <a:rPr lang="en-US" dirty="0" smtClean="0">
+                <a:solidFill>
+                  <a:schemeClr val="accent2">
+                    <a:lumMod val="75000"/>
+                  </a:schemeClr>
+                </a:solidFill>
+              </a:rPr>
+            </a:br>
+            <a:r>
+              <a:rPr lang="en-US" sz="2800" cap="all" dirty="0"/>
+              <a:t>Venues around ‘Affordable </a:t>
+            </a:r>
+            <a:r>
+              <a:rPr lang="en-US" sz="2800" cap="all" dirty="0" smtClean="0"/>
+              <a:t>Rental </a:t>
+            </a:r>
+            <a:r>
+              <a:rPr lang="en-US" sz="2800" cap="all" dirty="0"/>
+              <a:t>Projects’</a:t>
+            </a:r>
+            <a:br>
+              <a:rPr lang="en-US" sz="2800" cap="all" dirty="0"/>
+            </a:br>
+            <a:endParaRPr lang="en-US" sz="2800" dirty="0"/>
+          </a:p>
+        </p:txBody>
+      </p:sp>
+      <p:grpSp>
+        <p:nvGrpSpPr>
+          <p:cNvPr id="7" name="Group 6"/>
+          <p:cNvGrpSpPr/>
+          <p:nvPr/>
+        </p:nvGrpSpPr>
+        <p:grpSpPr>
+          <a:xfrm>
+            <a:off x="519062" y="2262384"/>
+            <a:ext cx="11486308" cy="2966434"/>
+            <a:chOff x="622093" y="2133600"/>
+            <a:chExt cx="11486308" cy="2966434"/>
+          </a:xfrm>
+        </p:grpSpPr>
+        <p:pic>
+          <p:nvPicPr>
+            <p:cNvPr id="5" name="Picture 4"/>
+            <p:cNvPicPr>
+              <a:picLocks noChangeAspect="1"/>
+            </p:cNvPicPr>
+            <p:nvPr/>
+          </p:nvPicPr>
+          <p:blipFill>
+            <a:blip r:embed="rId2"/>
+            <a:stretch>
+              <a:fillRect/>
+            </a:stretch>
+          </p:blipFill>
+          <p:spPr>
+            <a:xfrm>
+              <a:off x="622093" y="2133600"/>
+              <a:ext cx="11486308" cy="2966434"/>
+            </a:xfrm>
+            <a:prstGeom prst="rect">
+              <a:avLst/>
+            </a:prstGeom>
+          </p:spPr>
+        </p:pic>
+        <p:sp>
+          <p:nvSpPr>
+            <p:cNvPr id="6" name="Rectangle 5"/>
+            <p:cNvSpPr/>
+            <p:nvPr/>
+          </p:nvSpPr>
+          <p:spPr>
+            <a:xfrm>
+              <a:off x="6439437" y="2133600"/>
+              <a:ext cx="5668964" cy="2966434"/>
+            </a:xfrm>
+            <a:prstGeom prst="rect">
+              <a:avLst/>
+            </a:prstGeom>
+            <a:noFill/>
+            <a:ln w="73025">
+              <a:solidFill>
+                <a:srgbClr val="C00000"/>
+              </a:solidFill>
+              <a:prstDash val="sysDash"/>
+            </a:ln>
+          </p:spPr>
+          <p:style>
+            <a:lnRef idx="2">
+              <a:schemeClr val="accent1">
+                <a:shade val="50000"/>
+              </a:schemeClr>
+            </a:lnRef>
+            <a:fillRef idx="1">
+              <a:schemeClr val="accent1"/>
+            </a:fillRef>
+            <a:effectRef idx="0">
+              <a:schemeClr val="accent1"/>
+            </a:effectRef>
+            <a:fontRef idx="minor">
+              <a:schemeClr val="lt1"/>
+            </a:fontRef>
+          </p:style>
+          <p:txBody>
+            <a:bodyPr rtlCol="0" anchor="ctr"/>
+            <a:lstStyle/>
+            <a:p>
+              <a:pPr algn="ctr"/>
+              <a:endParaRPr lang="en-US"/>
+            </a:p>
+          </p:txBody>
+        </p:sp>
+      </p:grpSp>
+    </p:spTree>
+    <p:extLst>
+      <p:ext uri="{BB962C8B-B14F-4D97-AF65-F5344CB8AC3E}">
+        <p14:creationId xmlns:p14="http://schemas.microsoft.com/office/powerpoint/2010/main" val="2388896261"/>
       </p:ext>
     </p:extLst>
   </p:cSld>

</xml_diff>